<commit_message>
Add design ideas for Paste Lab icons
</commit_message>
<xml_diff>
--- a/doc/Icons-PasteLab.pptx
+++ b/doc/Icons-PasteLab.pptx
@@ -221,7 +221,7 @@
           <a:p>
             <a:fld id="{6699ACB9-486C-4D62-A3A7-AF98E13EFDA3}" type="datetimeFigureOut">
               <a:rPr lang="en-US" smtClean="0"/>
-              <a:t>6/7/2017</a:t>
+              <a:t>6/9/2017</a:t>
             </a:fld>
             <a:endParaRPr lang="en-US"/>
           </a:p>
@@ -752,7 +752,7 @@
             <a:fld id="{1D8BD707-D9CF-40AE-B4C6-C98DA3205C09}" type="datetimeFigureOut">
               <a:rPr lang="en-US" smtClean="0"/>
               <a:pPr/>
-              <a:t>6/7/2017</a:t>
+              <a:t>6/9/2017</a:t>
             </a:fld>
             <a:endParaRPr lang="en-US"/>
           </a:p>
@@ -917,7 +917,7 @@
             <a:fld id="{1D8BD707-D9CF-40AE-B4C6-C98DA3205C09}" type="datetimeFigureOut">
               <a:rPr lang="en-US" smtClean="0"/>
               <a:pPr/>
-              <a:t>6/7/2017</a:t>
+              <a:t>6/9/2017</a:t>
             </a:fld>
             <a:endParaRPr lang="en-US"/>
           </a:p>
@@ -1092,7 +1092,7 @@
             <a:fld id="{1D8BD707-D9CF-40AE-B4C6-C98DA3205C09}" type="datetimeFigureOut">
               <a:rPr lang="en-US" smtClean="0"/>
               <a:pPr/>
-              <a:t>6/7/2017</a:t>
+              <a:t>6/9/2017</a:t>
             </a:fld>
             <a:endParaRPr lang="en-US"/>
           </a:p>
@@ -1257,7 +1257,7 @@
             <a:fld id="{1D8BD707-D9CF-40AE-B4C6-C98DA3205C09}" type="datetimeFigureOut">
               <a:rPr lang="en-US" smtClean="0"/>
               <a:pPr/>
-              <a:t>6/7/2017</a:t>
+              <a:t>6/9/2017</a:t>
             </a:fld>
             <a:endParaRPr lang="en-US"/>
           </a:p>
@@ -1499,7 +1499,7 @@
             <a:fld id="{1D8BD707-D9CF-40AE-B4C6-C98DA3205C09}" type="datetimeFigureOut">
               <a:rPr lang="en-US" smtClean="0"/>
               <a:pPr/>
-              <a:t>6/7/2017</a:t>
+              <a:t>6/9/2017</a:t>
             </a:fld>
             <a:endParaRPr lang="en-US"/>
           </a:p>
@@ -1781,7 +1781,7 @@
             <a:fld id="{1D8BD707-D9CF-40AE-B4C6-C98DA3205C09}" type="datetimeFigureOut">
               <a:rPr lang="en-US" smtClean="0"/>
               <a:pPr/>
-              <a:t>6/7/2017</a:t>
+              <a:t>6/9/2017</a:t>
             </a:fld>
             <a:endParaRPr lang="en-US"/>
           </a:p>
@@ -2197,7 +2197,7 @@
             <a:fld id="{1D8BD707-D9CF-40AE-B4C6-C98DA3205C09}" type="datetimeFigureOut">
               <a:rPr lang="en-US" smtClean="0"/>
               <a:pPr/>
-              <a:t>6/7/2017</a:t>
+              <a:t>6/9/2017</a:t>
             </a:fld>
             <a:endParaRPr lang="en-US"/>
           </a:p>
@@ -2311,7 +2311,7 @@
             <a:fld id="{1D8BD707-D9CF-40AE-B4C6-C98DA3205C09}" type="datetimeFigureOut">
               <a:rPr lang="en-US" smtClean="0"/>
               <a:pPr/>
-              <a:t>6/7/2017</a:t>
+              <a:t>6/9/2017</a:t>
             </a:fld>
             <a:endParaRPr lang="en-US"/>
           </a:p>
@@ -2403,7 +2403,7 @@
             <a:fld id="{1D8BD707-D9CF-40AE-B4C6-C98DA3205C09}" type="datetimeFigureOut">
               <a:rPr lang="en-US" smtClean="0"/>
               <a:pPr/>
-              <a:t>6/7/2017</a:t>
+              <a:t>6/9/2017</a:t>
             </a:fld>
             <a:endParaRPr lang="en-US"/>
           </a:p>
@@ -2675,7 +2675,7 @@
             <a:fld id="{1D8BD707-D9CF-40AE-B4C6-C98DA3205C09}" type="datetimeFigureOut">
               <a:rPr lang="en-US" smtClean="0"/>
               <a:pPr/>
-              <a:t>6/7/2017</a:t>
+              <a:t>6/9/2017</a:t>
             </a:fld>
             <a:endParaRPr lang="en-US"/>
           </a:p>
@@ -2924,7 +2924,7 @@
             <a:fld id="{1D8BD707-D9CF-40AE-B4C6-C98DA3205C09}" type="datetimeFigureOut">
               <a:rPr lang="en-US" smtClean="0"/>
               <a:pPr/>
-              <a:t>6/7/2017</a:t>
+              <a:t>6/9/2017</a:t>
             </a:fld>
             <a:endParaRPr lang="en-US"/>
           </a:p>
@@ -3132,7 +3132,7 @@
             <a:fld id="{1D8BD707-D9CF-40AE-B4C6-C98DA3205C09}" type="datetimeFigureOut">
               <a:rPr lang="en-US" smtClean="0"/>
               <a:pPr/>
-              <a:t>6/7/2017</a:t>
+              <a:t>6/9/2017</a:t>
             </a:fld>
             <a:endParaRPr lang="en-US"/>
           </a:p>
@@ -3513,6 +3513,54 @@
           <a:chExt cx="0" cy="0"/>
         </a:xfrm>
       </p:grpSpPr>
+      <p:sp>
+        <p:nvSpPr>
+          <p:cNvPr id="61" name="Rectangle 60"/>
+          <p:cNvSpPr/>
+          <p:nvPr/>
+        </p:nvSpPr>
+        <p:spPr>
+          <a:xfrm rot="10800000">
+            <a:off x="751837" y="3016576"/>
+            <a:ext cx="549071" cy="549822"/>
+          </a:xfrm>
+          <a:prstGeom prst="rect">
+            <a:avLst/>
+          </a:prstGeom>
+          <a:solidFill>
+            <a:schemeClr val="bg2">
+              <a:lumMod val="75000"/>
+            </a:schemeClr>
+          </a:solidFill>
+          <a:ln>
+            <a:noFill/>
+          </a:ln>
+        </p:spPr>
+        <p:style>
+          <a:lnRef idx="2">
+            <a:schemeClr val="accent1">
+              <a:shade val="50000"/>
+            </a:schemeClr>
+          </a:lnRef>
+          <a:fillRef idx="1">
+            <a:schemeClr val="accent1"/>
+          </a:fillRef>
+          <a:effectRef idx="0">
+            <a:schemeClr val="accent1"/>
+          </a:effectRef>
+          <a:fontRef idx="minor">
+            <a:schemeClr val="lt1"/>
+          </a:fontRef>
+        </p:style>
+        <p:txBody>
+          <a:bodyPr wrap="none" lIns="0" tIns="0" rIns="0" bIns="0" rtlCol="0" anchor="ctr"/>
+          <a:lstStyle/>
+          <a:p>
+            <a:pPr algn="ctr"/>
+            <a:endParaRPr lang="en-US" b="1"/>
+          </a:p>
+        </p:txBody>
+      </p:sp>
       <p:sp>
         <p:nvSpPr>
           <p:cNvPr id="79" name="Rectangle 78"/>
@@ -5006,7 +5054,7 @@
         </p:nvSpPr>
         <p:spPr>
           <a:xfrm>
-            <a:off x="4361227" y="2673885"/>
+            <a:off x="448147" y="3613810"/>
             <a:ext cx="1114236" cy="430887"/>
           </a:xfrm>
           <a:prstGeom prst="rect">
@@ -5436,6 +5484,1827 @@
           <a:ln>
             <a:solidFill>
               <a:srgbClr val="0070C0"/>
+            </a:solidFill>
+          </a:ln>
+        </p:spPr>
+        <p:style>
+          <a:lnRef idx="2">
+            <a:schemeClr val="accent1">
+              <a:shade val="50000"/>
+            </a:schemeClr>
+          </a:lnRef>
+          <a:fillRef idx="1">
+            <a:schemeClr val="accent1"/>
+          </a:fillRef>
+          <a:effectRef idx="0">
+            <a:schemeClr val="accent1"/>
+          </a:effectRef>
+          <a:fontRef idx="minor">
+            <a:schemeClr val="lt1"/>
+          </a:fontRef>
+        </p:style>
+        <p:txBody>
+          <a:bodyPr rtlCol="0" anchor="ctr"/>
+          <a:lstStyle/>
+          <a:p>
+            <a:pPr algn="ctr"/>
+            <a:endParaRPr lang="en-US"/>
+          </a:p>
+        </p:txBody>
+      </p:sp>
+      <p:sp>
+        <p:nvSpPr>
+          <p:cNvPr id="44" name="TextBox 43"/>
+          <p:cNvSpPr txBox="1"/>
+          <p:nvPr/>
+        </p:nvSpPr>
+        <p:spPr>
+          <a:xfrm>
+            <a:off x="4361227" y="1335134"/>
+            <a:ext cx="1114236" cy="430887"/>
+          </a:xfrm>
+          <a:prstGeom prst="rect">
+            <a:avLst/>
+          </a:prstGeom>
+          <a:noFill/>
+        </p:spPr>
+        <p:txBody>
+          <a:bodyPr wrap="square" rtlCol="0">
+            <a:spAutoFit/>
+          </a:bodyPr>
+          <a:lstStyle/>
+          <a:p>
+            <a:pPr algn="ctr"/>
+            <a:r>
+              <a:rPr lang="en-US" sz="1100" dirty="0"/>
+              <a:t>Paste To Fill Slide</a:t>
+            </a:r>
+            <a:endParaRPr lang="en-SG" sz="1100" dirty="0"/>
+          </a:p>
+        </p:txBody>
+      </p:sp>
+      <p:sp>
+        <p:nvSpPr>
+          <p:cNvPr id="45" name="Rectangle 44"/>
+          <p:cNvSpPr/>
+          <p:nvPr/>
+        </p:nvSpPr>
+        <p:spPr>
+          <a:xfrm rot="10800000">
+            <a:off x="4614893" y="734062"/>
+            <a:ext cx="549071" cy="549822"/>
+          </a:xfrm>
+          <a:prstGeom prst="rect">
+            <a:avLst/>
+          </a:prstGeom>
+          <a:solidFill>
+            <a:schemeClr val="bg2">
+              <a:lumMod val="75000"/>
+            </a:schemeClr>
+          </a:solidFill>
+          <a:ln>
+            <a:noFill/>
+          </a:ln>
+        </p:spPr>
+        <p:style>
+          <a:lnRef idx="2">
+            <a:schemeClr val="accent1">
+              <a:shade val="50000"/>
+            </a:schemeClr>
+          </a:lnRef>
+          <a:fillRef idx="1">
+            <a:schemeClr val="accent1"/>
+          </a:fillRef>
+          <a:effectRef idx="0">
+            <a:schemeClr val="accent1"/>
+          </a:effectRef>
+          <a:fontRef idx="minor">
+            <a:schemeClr val="lt1"/>
+          </a:fontRef>
+        </p:style>
+        <p:txBody>
+          <a:bodyPr wrap="none" lIns="0" tIns="0" rIns="0" bIns="0" rtlCol="0" anchor="ctr"/>
+          <a:lstStyle/>
+          <a:p>
+            <a:pPr algn="ctr"/>
+            <a:endParaRPr lang="en-US" b="1"/>
+          </a:p>
+        </p:txBody>
+      </p:sp>
+      <p:sp>
+        <p:nvSpPr>
+          <p:cNvPr id="46" name="Rectangle 45"/>
+          <p:cNvSpPr/>
+          <p:nvPr/>
+        </p:nvSpPr>
+        <p:spPr>
+          <a:xfrm>
+            <a:off x="4626794" y="802215"/>
+            <a:ext cx="514597" cy="419689"/>
+          </a:xfrm>
+          <a:prstGeom prst="rect">
+            <a:avLst/>
+          </a:prstGeom>
+          <a:solidFill>
+            <a:srgbClr val="0070C0"/>
+          </a:solidFill>
+          <a:ln>
+            <a:solidFill>
+              <a:srgbClr val="0070C0"/>
+            </a:solidFill>
+          </a:ln>
+        </p:spPr>
+        <p:style>
+          <a:lnRef idx="2">
+            <a:schemeClr val="accent1">
+              <a:shade val="50000"/>
+            </a:schemeClr>
+          </a:lnRef>
+          <a:fillRef idx="1">
+            <a:schemeClr val="accent1"/>
+          </a:fillRef>
+          <a:effectRef idx="0">
+            <a:schemeClr val="accent1"/>
+          </a:effectRef>
+          <a:fontRef idx="minor">
+            <a:schemeClr val="lt1"/>
+          </a:fontRef>
+        </p:style>
+        <p:txBody>
+          <a:bodyPr rtlCol="0" anchor="ctr"/>
+          <a:lstStyle/>
+          <a:p>
+            <a:pPr algn="ctr"/>
+            <a:endParaRPr lang="en-US" dirty="0"/>
+          </a:p>
+        </p:txBody>
+      </p:sp>
+      <p:sp>
+        <p:nvSpPr>
+          <p:cNvPr id="47" name="Rectangle: Folded Corner 46"/>
+          <p:cNvSpPr/>
+          <p:nvPr/>
+        </p:nvSpPr>
+        <p:spPr>
+          <a:xfrm rot="10800000" flipH="1">
+            <a:off x="4835930" y="930705"/>
+            <a:ext cx="277140" cy="338178"/>
+          </a:xfrm>
+          <a:prstGeom prst="foldedCorner">
+            <a:avLst>
+              <a:gd name="adj" fmla="val 44103"/>
+            </a:avLst>
+          </a:prstGeom>
+          <a:solidFill>
+            <a:schemeClr val="bg1"/>
+          </a:solidFill>
+          <a:ln>
+            <a:solidFill>
+              <a:srgbClr val="0070C0"/>
+            </a:solidFill>
+          </a:ln>
+        </p:spPr>
+        <p:style>
+          <a:lnRef idx="2">
+            <a:schemeClr val="accent1">
+              <a:shade val="50000"/>
+            </a:schemeClr>
+          </a:lnRef>
+          <a:fillRef idx="1">
+            <a:schemeClr val="accent1"/>
+          </a:fillRef>
+          <a:effectRef idx="0">
+            <a:schemeClr val="accent1"/>
+          </a:effectRef>
+          <a:fontRef idx="minor">
+            <a:schemeClr val="lt1"/>
+          </a:fontRef>
+        </p:style>
+        <p:txBody>
+          <a:bodyPr rtlCol="0" anchor="ctr"/>
+          <a:lstStyle/>
+          <a:p>
+            <a:pPr algn="ctr"/>
+            <a:endParaRPr lang="en-US" dirty="0"/>
+          </a:p>
+        </p:txBody>
+      </p:sp>
+      <p:grpSp>
+        <p:nvGrpSpPr>
+          <p:cNvPr id="49" name="Group 48"/>
+          <p:cNvGrpSpPr/>
+          <p:nvPr/>
+        </p:nvGrpSpPr>
+        <p:grpSpPr>
+          <a:xfrm>
+            <a:off x="759400" y="3031732"/>
+            <a:ext cx="343904" cy="458320"/>
+            <a:chOff x="4821567" y="919204"/>
+            <a:chExt cx="343904" cy="458320"/>
+          </a:xfrm>
+        </p:grpSpPr>
+        <p:sp>
+          <p:nvSpPr>
+            <p:cNvPr id="51" name="Rectangle 50"/>
+            <p:cNvSpPr/>
+            <p:nvPr/>
+          </p:nvSpPr>
+          <p:spPr>
+            <a:xfrm>
+              <a:off x="4821567" y="971454"/>
+              <a:ext cx="343904" cy="406070"/>
+            </a:xfrm>
+            <a:prstGeom prst="rect">
+              <a:avLst/>
+            </a:prstGeom>
+            <a:solidFill>
+              <a:srgbClr val="0070C0"/>
+            </a:solidFill>
+            <a:ln>
+              <a:noFill/>
+            </a:ln>
+          </p:spPr>
+          <p:style>
+            <a:lnRef idx="2">
+              <a:schemeClr val="accent1">
+                <a:shade val="50000"/>
+              </a:schemeClr>
+            </a:lnRef>
+            <a:fillRef idx="1">
+              <a:schemeClr val="accent1"/>
+            </a:fillRef>
+            <a:effectRef idx="0">
+              <a:schemeClr val="accent1"/>
+            </a:effectRef>
+            <a:fontRef idx="minor">
+              <a:schemeClr val="lt1"/>
+            </a:fontRef>
+          </p:style>
+          <p:txBody>
+            <a:bodyPr rtlCol="0" anchor="ctr"/>
+            <a:lstStyle/>
+            <a:p>
+              <a:pPr algn="ctr"/>
+              <a:endParaRPr lang="en-US" dirty="0"/>
+            </a:p>
+          </p:txBody>
+        </p:sp>
+        <p:sp>
+          <p:nvSpPr>
+            <p:cNvPr id="53" name="Rounded Rectangle 227"/>
+            <p:cNvSpPr/>
+            <p:nvPr/>
+          </p:nvSpPr>
+          <p:spPr>
+            <a:xfrm rot="10800000">
+              <a:off x="4879960" y="919204"/>
+              <a:ext cx="234247" cy="101171"/>
+            </a:xfrm>
+            <a:custGeom>
+              <a:avLst/>
+              <a:gdLst/>
+              <a:ahLst/>
+              <a:cxnLst/>
+              <a:rect l="l" t="t" r="r" b="b"/>
+              <a:pathLst>
+                <a:path w="286327" h="1000124">
+                  <a:moveTo>
+                    <a:pt x="2115" y="0"/>
+                  </a:moveTo>
+                  <a:lnTo>
+                    <a:pt x="284212" y="0"/>
+                  </a:lnTo>
+                  <a:cubicBezTo>
+                    <a:pt x="286188" y="3367"/>
+                    <a:pt x="286327" y="6905"/>
+                    <a:pt x="286327" y="10476"/>
+                  </a:cubicBezTo>
+                  <a:lnTo>
+                    <a:pt x="286327" y="712825"/>
+                  </a:lnTo>
+                  <a:cubicBezTo>
+                    <a:pt x="286327" y="772047"/>
+                    <a:pt x="247915" y="822299"/>
+                    <a:pt x="194109" y="838409"/>
+                  </a:cubicBezTo>
+                  <a:cubicBezTo>
+                    <a:pt x="194108" y="875332"/>
+                    <a:pt x="194108" y="912256"/>
+                    <a:pt x="194108" y="949179"/>
+                  </a:cubicBezTo>
+                  <a:cubicBezTo>
+                    <a:pt x="194108" y="977315"/>
+                    <a:pt x="171299" y="1000124"/>
+                    <a:pt x="143163" y="1000124"/>
+                  </a:cubicBezTo>
+                  <a:lnTo>
+                    <a:pt x="143164" y="1000123"/>
+                  </a:lnTo>
+                  <a:cubicBezTo>
+                    <a:pt x="115028" y="1000123"/>
+                    <a:pt x="92219" y="977314"/>
+                    <a:pt x="92219" y="949178"/>
+                  </a:cubicBezTo>
+                  <a:lnTo>
+                    <a:pt x="92219" y="838409"/>
+                  </a:lnTo>
+                  <a:cubicBezTo>
+                    <a:pt x="38413" y="822299"/>
+                    <a:pt x="0" y="772048"/>
+                    <a:pt x="0" y="712825"/>
+                  </a:cubicBezTo>
+                  <a:lnTo>
+                    <a:pt x="0" y="10476"/>
+                  </a:lnTo>
+                  <a:close/>
+                </a:path>
+              </a:pathLst>
+            </a:custGeom>
+            <a:solidFill>
+              <a:srgbClr val="0070C0"/>
+            </a:solidFill>
+            <a:ln w="19050">
+              <a:solidFill>
+                <a:schemeClr val="bg1"/>
+              </a:solidFill>
+            </a:ln>
+          </p:spPr>
+          <p:style>
+            <a:lnRef idx="2">
+              <a:schemeClr val="accent1">
+                <a:shade val="50000"/>
+              </a:schemeClr>
+            </a:lnRef>
+            <a:fillRef idx="1">
+              <a:schemeClr val="accent1"/>
+            </a:fillRef>
+            <a:effectRef idx="0">
+              <a:schemeClr val="accent1"/>
+            </a:effectRef>
+            <a:fontRef idx="minor">
+              <a:schemeClr val="lt1"/>
+            </a:fontRef>
+          </p:style>
+          <p:txBody>
+            <a:bodyPr rtlCol="0" anchor="ctr"/>
+            <a:lstStyle/>
+            <a:p>
+              <a:pPr algn="ctr"/>
+              <a:endParaRPr lang="en-SG"/>
+            </a:p>
+          </p:txBody>
+        </p:sp>
+      </p:grpSp>
+      <p:sp>
+        <p:nvSpPr>
+          <p:cNvPr id="60" name="Rectangle 59"/>
+          <p:cNvSpPr/>
+          <p:nvPr/>
+        </p:nvSpPr>
+        <p:spPr>
+          <a:xfrm>
+            <a:off x="856366" y="3244375"/>
+            <a:ext cx="429324" cy="305311"/>
+          </a:xfrm>
+          <a:prstGeom prst="rect">
+            <a:avLst/>
+          </a:prstGeom>
+          <a:solidFill>
+            <a:srgbClr val="0070C0"/>
+          </a:solidFill>
+          <a:ln w="19050">
+            <a:solidFill>
+              <a:schemeClr val="bg1"/>
+            </a:solidFill>
+          </a:ln>
+        </p:spPr>
+        <p:style>
+          <a:lnRef idx="2">
+            <a:schemeClr val="accent1">
+              <a:shade val="50000"/>
+            </a:schemeClr>
+          </a:lnRef>
+          <a:fillRef idx="1">
+            <a:schemeClr val="accent1"/>
+          </a:fillRef>
+          <a:effectRef idx="0">
+            <a:schemeClr val="accent1"/>
+          </a:effectRef>
+          <a:fontRef idx="minor">
+            <a:schemeClr val="lt1"/>
+          </a:fontRef>
+        </p:style>
+        <p:txBody>
+          <a:bodyPr rtlCol="0" anchor="ctr"/>
+          <a:lstStyle/>
+          <a:p>
+            <a:pPr algn="ctr"/>
+            <a:endParaRPr lang="en-US" dirty="0"/>
+          </a:p>
+        </p:txBody>
+      </p:sp>
+      <p:sp>
+        <p:nvSpPr>
+          <p:cNvPr id="62" name="Rectangle 61"/>
+          <p:cNvSpPr/>
+          <p:nvPr/>
+        </p:nvSpPr>
+        <p:spPr>
+          <a:xfrm rot="10800000">
+            <a:off x="1810624" y="3016576"/>
+            <a:ext cx="549071" cy="549822"/>
+          </a:xfrm>
+          <a:prstGeom prst="rect">
+            <a:avLst/>
+          </a:prstGeom>
+          <a:solidFill>
+            <a:schemeClr val="bg2">
+              <a:lumMod val="75000"/>
+            </a:schemeClr>
+          </a:solidFill>
+          <a:ln>
+            <a:noFill/>
+          </a:ln>
+        </p:spPr>
+        <p:style>
+          <a:lnRef idx="2">
+            <a:schemeClr val="accent1">
+              <a:shade val="50000"/>
+            </a:schemeClr>
+          </a:lnRef>
+          <a:fillRef idx="1">
+            <a:schemeClr val="accent1"/>
+          </a:fillRef>
+          <a:effectRef idx="0">
+            <a:schemeClr val="accent1"/>
+          </a:effectRef>
+          <a:fontRef idx="minor">
+            <a:schemeClr val="lt1"/>
+          </a:fontRef>
+        </p:style>
+        <p:txBody>
+          <a:bodyPr wrap="none" lIns="0" tIns="0" rIns="0" bIns="0" rtlCol="0" anchor="ctr"/>
+          <a:lstStyle/>
+          <a:p>
+            <a:pPr algn="ctr"/>
+            <a:endParaRPr lang="en-US" b="1"/>
+          </a:p>
+        </p:txBody>
+      </p:sp>
+      <p:grpSp>
+        <p:nvGrpSpPr>
+          <p:cNvPr id="63" name="Group 62"/>
+          <p:cNvGrpSpPr/>
+          <p:nvPr/>
+        </p:nvGrpSpPr>
+        <p:grpSpPr>
+          <a:xfrm>
+            <a:off x="1818187" y="3031732"/>
+            <a:ext cx="343904" cy="458320"/>
+            <a:chOff x="4821567" y="919204"/>
+            <a:chExt cx="343904" cy="458320"/>
+          </a:xfrm>
+        </p:grpSpPr>
+        <p:sp>
+          <p:nvSpPr>
+            <p:cNvPr id="64" name="Rectangle 63"/>
+            <p:cNvSpPr/>
+            <p:nvPr/>
+          </p:nvSpPr>
+          <p:spPr>
+            <a:xfrm>
+              <a:off x="4821567" y="971454"/>
+              <a:ext cx="343904" cy="406070"/>
+            </a:xfrm>
+            <a:prstGeom prst="rect">
+              <a:avLst/>
+            </a:prstGeom>
+            <a:solidFill>
+              <a:srgbClr val="0070C0"/>
+            </a:solidFill>
+            <a:ln>
+              <a:noFill/>
+            </a:ln>
+          </p:spPr>
+          <p:style>
+            <a:lnRef idx="2">
+              <a:schemeClr val="accent1">
+                <a:shade val="50000"/>
+              </a:schemeClr>
+            </a:lnRef>
+            <a:fillRef idx="1">
+              <a:schemeClr val="accent1"/>
+            </a:fillRef>
+            <a:effectRef idx="0">
+              <a:schemeClr val="accent1"/>
+            </a:effectRef>
+            <a:fontRef idx="minor">
+              <a:schemeClr val="lt1"/>
+            </a:fontRef>
+          </p:style>
+          <p:txBody>
+            <a:bodyPr rtlCol="0" anchor="ctr"/>
+            <a:lstStyle/>
+            <a:p>
+              <a:pPr algn="ctr"/>
+              <a:endParaRPr lang="en-US" dirty="0"/>
+            </a:p>
+          </p:txBody>
+        </p:sp>
+        <p:sp>
+          <p:nvSpPr>
+            <p:cNvPr id="65" name="Rounded Rectangle 227"/>
+            <p:cNvSpPr/>
+            <p:nvPr/>
+          </p:nvSpPr>
+          <p:spPr>
+            <a:xfrm rot="10800000">
+              <a:off x="4879960" y="919204"/>
+              <a:ext cx="234247" cy="101171"/>
+            </a:xfrm>
+            <a:custGeom>
+              <a:avLst/>
+              <a:gdLst/>
+              <a:ahLst/>
+              <a:cxnLst/>
+              <a:rect l="l" t="t" r="r" b="b"/>
+              <a:pathLst>
+                <a:path w="286327" h="1000124">
+                  <a:moveTo>
+                    <a:pt x="2115" y="0"/>
+                  </a:moveTo>
+                  <a:lnTo>
+                    <a:pt x="284212" y="0"/>
+                  </a:lnTo>
+                  <a:cubicBezTo>
+                    <a:pt x="286188" y="3367"/>
+                    <a:pt x="286327" y="6905"/>
+                    <a:pt x="286327" y="10476"/>
+                  </a:cubicBezTo>
+                  <a:lnTo>
+                    <a:pt x="286327" y="712825"/>
+                  </a:lnTo>
+                  <a:cubicBezTo>
+                    <a:pt x="286327" y="772047"/>
+                    <a:pt x="247915" y="822299"/>
+                    <a:pt x="194109" y="838409"/>
+                  </a:cubicBezTo>
+                  <a:cubicBezTo>
+                    <a:pt x="194108" y="875332"/>
+                    <a:pt x="194108" y="912256"/>
+                    <a:pt x="194108" y="949179"/>
+                  </a:cubicBezTo>
+                  <a:cubicBezTo>
+                    <a:pt x="194108" y="977315"/>
+                    <a:pt x="171299" y="1000124"/>
+                    <a:pt x="143163" y="1000124"/>
+                  </a:cubicBezTo>
+                  <a:lnTo>
+                    <a:pt x="143164" y="1000123"/>
+                  </a:lnTo>
+                  <a:cubicBezTo>
+                    <a:pt x="115028" y="1000123"/>
+                    <a:pt x="92219" y="977314"/>
+                    <a:pt x="92219" y="949178"/>
+                  </a:cubicBezTo>
+                  <a:lnTo>
+                    <a:pt x="92219" y="838409"/>
+                  </a:lnTo>
+                  <a:cubicBezTo>
+                    <a:pt x="38413" y="822299"/>
+                    <a:pt x="0" y="772048"/>
+                    <a:pt x="0" y="712825"/>
+                  </a:cubicBezTo>
+                  <a:lnTo>
+                    <a:pt x="0" y="10476"/>
+                  </a:lnTo>
+                  <a:close/>
+                </a:path>
+              </a:pathLst>
+            </a:custGeom>
+            <a:solidFill>
+              <a:srgbClr val="0070C0"/>
+            </a:solidFill>
+            <a:ln w="19050">
+              <a:solidFill>
+                <a:schemeClr val="bg1"/>
+              </a:solidFill>
+            </a:ln>
+          </p:spPr>
+          <p:style>
+            <a:lnRef idx="2">
+              <a:schemeClr val="accent1">
+                <a:shade val="50000"/>
+              </a:schemeClr>
+            </a:lnRef>
+            <a:fillRef idx="1">
+              <a:schemeClr val="accent1"/>
+            </a:fillRef>
+            <a:effectRef idx="0">
+              <a:schemeClr val="accent1"/>
+            </a:effectRef>
+            <a:fontRef idx="minor">
+              <a:schemeClr val="lt1"/>
+            </a:fontRef>
+          </p:style>
+          <p:txBody>
+            <a:bodyPr rtlCol="0" anchor="ctr"/>
+            <a:lstStyle/>
+            <a:p>
+              <a:pPr algn="ctr"/>
+              <a:endParaRPr lang="en-SG"/>
+            </a:p>
+          </p:txBody>
+        </p:sp>
+      </p:grpSp>
+      <p:sp>
+        <p:nvSpPr>
+          <p:cNvPr id="67" name="TextBox 66"/>
+          <p:cNvSpPr txBox="1"/>
+          <p:nvPr/>
+        </p:nvSpPr>
+        <p:spPr>
+          <a:xfrm>
+            <a:off x="4513627" y="2826285"/>
+            <a:ext cx="1114236" cy="430887"/>
+          </a:xfrm>
+          <a:prstGeom prst="rect">
+            <a:avLst/>
+          </a:prstGeom>
+          <a:noFill/>
+        </p:spPr>
+        <p:txBody>
+          <a:bodyPr wrap="square" rtlCol="0">
+            <a:spAutoFit/>
+          </a:bodyPr>
+          <a:lstStyle/>
+          <a:p>
+            <a:pPr algn="ctr"/>
+            <a:r>
+              <a:rPr lang="en-US" sz="1100" dirty="0"/>
+              <a:t>Paste To Fill Slide</a:t>
+            </a:r>
+            <a:endParaRPr lang="en-SG" sz="1100" dirty="0"/>
+          </a:p>
+        </p:txBody>
+      </p:sp>
+      <p:sp>
+        <p:nvSpPr>
+          <p:cNvPr id="70" name="Freeform: Shape 69"/>
+          <p:cNvSpPr/>
+          <p:nvPr/>
+        </p:nvSpPr>
+        <p:spPr>
+          <a:xfrm rot="20184335">
+            <a:off x="2028071" y="3172827"/>
+            <a:ext cx="275211" cy="377159"/>
+          </a:xfrm>
+          <a:custGeom>
+            <a:avLst/>
+            <a:gdLst>
+              <a:gd name="connsiteX0" fmla="*/ 340041 w 685923"/>
+              <a:gd name="connsiteY0" fmla="*/ 0 h 940011"/>
+              <a:gd name="connsiteX1" fmla="*/ 685923 w 685923"/>
+              <a:gd name="connsiteY1" fmla="*/ 772625 h 940011"/>
+              <a:gd name="connsiteX2" fmla="*/ 680032 w 685923"/>
+              <a:gd name="connsiteY2" fmla="*/ 772647 h 940011"/>
+              <a:gd name="connsiteX3" fmla="*/ 424252 w 685923"/>
+              <a:gd name="connsiteY3" fmla="*/ 660929 h 940011"/>
+              <a:gd name="connsiteX4" fmla="*/ 424252 w 685923"/>
+              <a:gd name="connsiteY4" fmla="*/ 940011 h 940011"/>
+              <a:gd name="connsiteX5" fmla="*/ 244190 w 685923"/>
+              <a:gd name="connsiteY5" fmla="*/ 940011 h 940011"/>
+              <a:gd name="connsiteX6" fmla="*/ 244190 w 685923"/>
+              <a:gd name="connsiteY6" fmla="*/ 641386 h 940011"/>
+              <a:gd name="connsiteX7" fmla="*/ 0 w 685923"/>
+              <a:gd name="connsiteY7" fmla="*/ 774637 h 940011"/>
+              <a:gd name="connsiteX8" fmla="*/ 244190 w 685923"/>
+              <a:gd name="connsiteY8" fmla="*/ 218355 h 940011"/>
+              <a:gd name="connsiteX9" fmla="*/ 244190 w 685923"/>
+              <a:gd name="connsiteY9" fmla="*/ 210957 h 940011"/>
+              <a:gd name="connsiteX10" fmla="*/ 247438 w 685923"/>
+              <a:gd name="connsiteY10" fmla="*/ 210957 h 940011"/>
+            </a:gdLst>
+            <a:ahLst/>
+            <a:cxnLst>
+              <a:cxn ang="0">
+                <a:pos x="connsiteX0" y="connsiteY0"/>
+              </a:cxn>
+              <a:cxn ang="0">
+                <a:pos x="connsiteX1" y="connsiteY1"/>
+              </a:cxn>
+              <a:cxn ang="0">
+                <a:pos x="connsiteX2" y="connsiteY2"/>
+              </a:cxn>
+              <a:cxn ang="0">
+                <a:pos x="connsiteX3" y="connsiteY3"/>
+              </a:cxn>
+              <a:cxn ang="0">
+                <a:pos x="connsiteX4" y="connsiteY4"/>
+              </a:cxn>
+              <a:cxn ang="0">
+                <a:pos x="connsiteX5" y="connsiteY5"/>
+              </a:cxn>
+              <a:cxn ang="0">
+                <a:pos x="connsiteX6" y="connsiteY6"/>
+              </a:cxn>
+              <a:cxn ang="0">
+                <a:pos x="connsiteX7" y="connsiteY7"/>
+              </a:cxn>
+              <a:cxn ang="0">
+                <a:pos x="connsiteX8" y="connsiteY8"/>
+              </a:cxn>
+              <a:cxn ang="0">
+                <a:pos x="connsiteX9" y="connsiteY9"/>
+              </a:cxn>
+              <a:cxn ang="0">
+                <a:pos x="connsiteX10" y="connsiteY10"/>
+              </a:cxn>
+            </a:cxnLst>
+            <a:rect l="l" t="t" r="r" b="b"/>
+            <a:pathLst>
+              <a:path w="685923" h="940011">
+                <a:moveTo>
+                  <a:pt x="340041" y="0"/>
+                </a:moveTo>
+                <a:lnTo>
+                  <a:pt x="685923" y="772625"/>
+                </a:lnTo>
+                <a:lnTo>
+                  <a:pt x="680032" y="772647"/>
+                </a:lnTo>
+                <a:lnTo>
+                  <a:pt x="424252" y="660929"/>
+                </a:lnTo>
+                <a:lnTo>
+                  <a:pt x="424252" y="940011"/>
+                </a:lnTo>
+                <a:lnTo>
+                  <a:pt x="244190" y="940011"/>
+                </a:lnTo>
+                <a:lnTo>
+                  <a:pt x="244190" y="641386"/>
+                </a:lnTo>
+                <a:lnTo>
+                  <a:pt x="0" y="774637"/>
+                </a:lnTo>
+                <a:lnTo>
+                  <a:pt x="244190" y="218355"/>
+                </a:lnTo>
+                <a:lnTo>
+                  <a:pt x="244190" y="210957"/>
+                </a:lnTo>
+                <a:lnTo>
+                  <a:pt x="247438" y="210957"/>
+                </a:lnTo>
+                <a:close/>
+              </a:path>
+            </a:pathLst>
+          </a:custGeom>
+          <a:solidFill>
+            <a:srgbClr val="0070C0"/>
+          </a:solidFill>
+          <a:ln w="19050">
+            <a:solidFill>
+              <a:schemeClr val="bg1"/>
+            </a:solidFill>
+          </a:ln>
+        </p:spPr>
+        <p:style>
+          <a:lnRef idx="2">
+            <a:schemeClr val="accent1">
+              <a:shade val="50000"/>
+            </a:schemeClr>
+          </a:lnRef>
+          <a:fillRef idx="1">
+            <a:schemeClr val="accent1"/>
+          </a:fillRef>
+          <a:effectRef idx="0">
+            <a:schemeClr val="accent1"/>
+          </a:effectRef>
+          <a:fontRef idx="minor">
+            <a:schemeClr val="lt1"/>
+          </a:fontRef>
+        </p:style>
+        <p:txBody>
+          <a:bodyPr rtlCol="0" anchor="ctr"/>
+          <a:lstStyle/>
+          <a:p>
+            <a:pPr algn="ctr"/>
+            <a:endParaRPr lang="en-US" dirty="0"/>
+          </a:p>
+        </p:txBody>
+      </p:sp>
+      <p:sp>
+        <p:nvSpPr>
+          <p:cNvPr id="100" name="Rectangle 99"/>
+          <p:cNvSpPr/>
+          <p:nvPr/>
+        </p:nvSpPr>
+        <p:spPr>
+          <a:xfrm rot="10800000">
+            <a:off x="721065" y="4396018"/>
+            <a:ext cx="549071" cy="549822"/>
+          </a:xfrm>
+          <a:prstGeom prst="rect">
+            <a:avLst/>
+          </a:prstGeom>
+          <a:solidFill>
+            <a:schemeClr val="bg2">
+              <a:lumMod val="75000"/>
+            </a:schemeClr>
+          </a:solidFill>
+          <a:ln>
+            <a:noFill/>
+          </a:ln>
+        </p:spPr>
+        <p:style>
+          <a:lnRef idx="2">
+            <a:schemeClr val="accent1">
+              <a:shade val="50000"/>
+            </a:schemeClr>
+          </a:lnRef>
+          <a:fillRef idx="1">
+            <a:schemeClr val="accent1"/>
+          </a:fillRef>
+          <a:effectRef idx="0">
+            <a:schemeClr val="accent1"/>
+          </a:effectRef>
+          <a:fontRef idx="minor">
+            <a:schemeClr val="lt1"/>
+          </a:fontRef>
+        </p:style>
+        <p:txBody>
+          <a:bodyPr wrap="none" lIns="0" tIns="0" rIns="0" bIns="0" rtlCol="0" anchor="ctr"/>
+          <a:lstStyle/>
+          <a:p>
+            <a:pPr algn="ctr"/>
+            <a:endParaRPr lang="en-US" b="1"/>
+          </a:p>
+        </p:txBody>
+      </p:sp>
+      <p:grpSp>
+        <p:nvGrpSpPr>
+          <p:cNvPr id="101" name="Group 100"/>
+          <p:cNvGrpSpPr/>
+          <p:nvPr/>
+        </p:nvGrpSpPr>
+        <p:grpSpPr>
+          <a:xfrm>
+            <a:off x="728628" y="4411174"/>
+            <a:ext cx="343904" cy="458320"/>
+            <a:chOff x="4821567" y="919204"/>
+            <a:chExt cx="343904" cy="458320"/>
+          </a:xfrm>
+        </p:grpSpPr>
+        <p:sp>
+          <p:nvSpPr>
+            <p:cNvPr id="102" name="Rectangle 101"/>
+            <p:cNvSpPr/>
+            <p:nvPr/>
+          </p:nvSpPr>
+          <p:spPr>
+            <a:xfrm>
+              <a:off x="4821567" y="971454"/>
+              <a:ext cx="343904" cy="406070"/>
+            </a:xfrm>
+            <a:prstGeom prst="rect">
+              <a:avLst/>
+            </a:prstGeom>
+            <a:solidFill>
+              <a:srgbClr val="0070C0"/>
+            </a:solidFill>
+            <a:ln>
+              <a:noFill/>
+            </a:ln>
+          </p:spPr>
+          <p:style>
+            <a:lnRef idx="2">
+              <a:schemeClr val="accent1">
+                <a:shade val="50000"/>
+              </a:schemeClr>
+            </a:lnRef>
+            <a:fillRef idx="1">
+              <a:schemeClr val="accent1"/>
+            </a:fillRef>
+            <a:effectRef idx="0">
+              <a:schemeClr val="accent1"/>
+            </a:effectRef>
+            <a:fontRef idx="minor">
+              <a:schemeClr val="lt1"/>
+            </a:fontRef>
+          </p:style>
+          <p:txBody>
+            <a:bodyPr rtlCol="0" anchor="ctr"/>
+            <a:lstStyle/>
+            <a:p>
+              <a:pPr algn="ctr"/>
+              <a:endParaRPr lang="en-US" dirty="0"/>
+            </a:p>
+          </p:txBody>
+        </p:sp>
+        <p:sp>
+          <p:nvSpPr>
+            <p:cNvPr id="103" name="Rounded Rectangle 227"/>
+            <p:cNvSpPr/>
+            <p:nvPr/>
+          </p:nvSpPr>
+          <p:spPr>
+            <a:xfrm rot="10800000">
+              <a:off x="4879960" y="919204"/>
+              <a:ext cx="234247" cy="101171"/>
+            </a:xfrm>
+            <a:custGeom>
+              <a:avLst/>
+              <a:gdLst/>
+              <a:ahLst/>
+              <a:cxnLst/>
+              <a:rect l="l" t="t" r="r" b="b"/>
+              <a:pathLst>
+                <a:path w="286327" h="1000124">
+                  <a:moveTo>
+                    <a:pt x="2115" y="0"/>
+                  </a:moveTo>
+                  <a:lnTo>
+                    <a:pt x="284212" y="0"/>
+                  </a:lnTo>
+                  <a:cubicBezTo>
+                    <a:pt x="286188" y="3367"/>
+                    <a:pt x="286327" y="6905"/>
+                    <a:pt x="286327" y="10476"/>
+                  </a:cubicBezTo>
+                  <a:lnTo>
+                    <a:pt x="286327" y="712825"/>
+                  </a:lnTo>
+                  <a:cubicBezTo>
+                    <a:pt x="286327" y="772047"/>
+                    <a:pt x="247915" y="822299"/>
+                    <a:pt x="194109" y="838409"/>
+                  </a:cubicBezTo>
+                  <a:cubicBezTo>
+                    <a:pt x="194108" y="875332"/>
+                    <a:pt x="194108" y="912256"/>
+                    <a:pt x="194108" y="949179"/>
+                  </a:cubicBezTo>
+                  <a:cubicBezTo>
+                    <a:pt x="194108" y="977315"/>
+                    <a:pt x="171299" y="1000124"/>
+                    <a:pt x="143163" y="1000124"/>
+                  </a:cubicBezTo>
+                  <a:lnTo>
+                    <a:pt x="143164" y="1000123"/>
+                  </a:lnTo>
+                  <a:cubicBezTo>
+                    <a:pt x="115028" y="1000123"/>
+                    <a:pt x="92219" y="977314"/>
+                    <a:pt x="92219" y="949178"/>
+                  </a:cubicBezTo>
+                  <a:lnTo>
+                    <a:pt x="92219" y="838409"/>
+                  </a:lnTo>
+                  <a:cubicBezTo>
+                    <a:pt x="38413" y="822299"/>
+                    <a:pt x="0" y="772048"/>
+                    <a:pt x="0" y="712825"/>
+                  </a:cubicBezTo>
+                  <a:lnTo>
+                    <a:pt x="0" y="10476"/>
+                  </a:lnTo>
+                  <a:close/>
+                </a:path>
+              </a:pathLst>
+            </a:custGeom>
+            <a:solidFill>
+              <a:srgbClr val="0070C0"/>
+            </a:solidFill>
+            <a:ln w="19050">
+              <a:solidFill>
+                <a:schemeClr val="bg1"/>
+              </a:solidFill>
+            </a:ln>
+          </p:spPr>
+          <p:style>
+            <a:lnRef idx="2">
+              <a:schemeClr val="accent1">
+                <a:shade val="50000"/>
+              </a:schemeClr>
+            </a:lnRef>
+            <a:fillRef idx="1">
+              <a:schemeClr val="accent1"/>
+            </a:fillRef>
+            <a:effectRef idx="0">
+              <a:schemeClr val="accent1"/>
+            </a:effectRef>
+            <a:fontRef idx="minor">
+              <a:schemeClr val="lt1"/>
+            </a:fontRef>
+          </p:style>
+          <p:txBody>
+            <a:bodyPr rtlCol="0" anchor="ctr"/>
+            <a:lstStyle/>
+            <a:p>
+              <a:pPr algn="ctr"/>
+              <a:endParaRPr lang="en-SG"/>
+            </a:p>
+          </p:txBody>
+        </p:sp>
+      </p:grpSp>
+      <p:sp>
+        <p:nvSpPr>
+          <p:cNvPr id="107" name="Oval 106"/>
+          <p:cNvSpPr/>
+          <p:nvPr/>
+        </p:nvSpPr>
+        <p:spPr>
+          <a:xfrm>
+            <a:off x="907649" y="4579751"/>
+            <a:ext cx="336754" cy="336754"/>
+          </a:xfrm>
+          <a:prstGeom prst="ellipse">
+            <a:avLst/>
+          </a:prstGeom>
+          <a:solidFill>
+            <a:srgbClr val="0070C0"/>
+          </a:solidFill>
+          <a:ln>
+            <a:solidFill>
+              <a:schemeClr val="bg1"/>
+            </a:solidFill>
+            <a:prstDash val="sysDot"/>
+          </a:ln>
+        </p:spPr>
+        <p:style>
+          <a:lnRef idx="2">
+            <a:schemeClr val="accent1">
+              <a:shade val="50000"/>
+            </a:schemeClr>
+          </a:lnRef>
+          <a:fillRef idx="1">
+            <a:schemeClr val="accent1"/>
+          </a:fillRef>
+          <a:effectRef idx="0">
+            <a:schemeClr val="accent1"/>
+          </a:effectRef>
+          <a:fontRef idx="minor">
+            <a:schemeClr val="lt1"/>
+          </a:fontRef>
+        </p:style>
+        <p:txBody>
+          <a:bodyPr rtlCol="0" anchor="ctr"/>
+          <a:lstStyle/>
+          <a:p>
+            <a:pPr algn="ctr"/>
+            <a:endParaRPr lang="en-US"/>
+          </a:p>
+        </p:txBody>
+      </p:sp>
+      <p:sp>
+        <p:nvSpPr>
+          <p:cNvPr id="108" name="TextBox 107"/>
+          <p:cNvSpPr txBox="1"/>
+          <p:nvPr/>
+        </p:nvSpPr>
+        <p:spPr>
+          <a:xfrm>
+            <a:off x="1528041" y="3602314"/>
+            <a:ext cx="1114236" cy="430887"/>
+          </a:xfrm>
+          <a:prstGeom prst="rect">
+            <a:avLst/>
+          </a:prstGeom>
+          <a:noFill/>
+        </p:spPr>
+        <p:txBody>
+          <a:bodyPr wrap="square" rtlCol="0">
+            <a:spAutoFit/>
+          </a:bodyPr>
+          <a:lstStyle/>
+          <a:p>
+            <a:pPr algn="ctr"/>
+            <a:r>
+              <a:rPr lang="en-US" sz="1100" dirty="0"/>
+              <a:t>Paste At Cursor Position</a:t>
+            </a:r>
+            <a:endParaRPr lang="en-SG" sz="1100" dirty="0"/>
+          </a:p>
+        </p:txBody>
+      </p:sp>
+      <p:sp>
+        <p:nvSpPr>
+          <p:cNvPr id="110" name="TextBox 109"/>
+          <p:cNvSpPr txBox="1"/>
+          <p:nvPr/>
+        </p:nvSpPr>
+        <p:spPr>
+          <a:xfrm>
+            <a:off x="2458236" y="3594417"/>
+            <a:ext cx="1114236" cy="430887"/>
+          </a:xfrm>
+          <a:prstGeom prst="rect">
+            <a:avLst/>
+          </a:prstGeom>
+          <a:noFill/>
+        </p:spPr>
+        <p:txBody>
+          <a:bodyPr wrap="square" rtlCol="0">
+            <a:spAutoFit/>
+          </a:bodyPr>
+          <a:lstStyle/>
+          <a:p>
+            <a:pPr algn="ctr"/>
+            <a:r>
+              <a:rPr lang="en-US" sz="1100" dirty="0"/>
+              <a:t>Paste At Original Position</a:t>
+            </a:r>
+            <a:endParaRPr lang="en-SG" sz="1100" dirty="0"/>
+          </a:p>
+        </p:txBody>
+      </p:sp>
+      <p:sp>
+        <p:nvSpPr>
+          <p:cNvPr id="111" name="TextBox 110"/>
+          <p:cNvSpPr txBox="1"/>
+          <p:nvPr/>
+        </p:nvSpPr>
+        <p:spPr>
+          <a:xfrm>
+            <a:off x="448147" y="4992502"/>
+            <a:ext cx="1114236" cy="430887"/>
+          </a:xfrm>
+          <a:prstGeom prst="rect">
+            <a:avLst/>
+          </a:prstGeom>
+          <a:noFill/>
+        </p:spPr>
+        <p:txBody>
+          <a:bodyPr wrap="square" rtlCol="0">
+            <a:spAutoFit/>
+          </a:bodyPr>
+          <a:lstStyle/>
+          <a:p>
+            <a:pPr algn="ctr"/>
+            <a:r>
+              <a:rPr lang="en-US" sz="1100" dirty="0"/>
+              <a:t>Replace With Clipboard</a:t>
+            </a:r>
+            <a:endParaRPr lang="en-SG" sz="1100" dirty="0"/>
+          </a:p>
+        </p:txBody>
+      </p:sp>
+      <p:sp>
+        <p:nvSpPr>
+          <p:cNvPr id="112" name="Rectangle 111"/>
+          <p:cNvSpPr/>
+          <p:nvPr/>
+        </p:nvSpPr>
+        <p:spPr>
+          <a:xfrm rot="10800000">
+            <a:off x="1852035" y="4407746"/>
+            <a:ext cx="549071" cy="549822"/>
+          </a:xfrm>
+          <a:prstGeom prst="rect">
+            <a:avLst/>
+          </a:prstGeom>
+          <a:solidFill>
+            <a:schemeClr val="bg2">
+              <a:lumMod val="75000"/>
+            </a:schemeClr>
+          </a:solidFill>
+          <a:ln>
+            <a:noFill/>
+          </a:ln>
+        </p:spPr>
+        <p:style>
+          <a:lnRef idx="2">
+            <a:schemeClr val="accent1">
+              <a:shade val="50000"/>
+            </a:schemeClr>
+          </a:lnRef>
+          <a:fillRef idx="1">
+            <a:schemeClr val="accent1"/>
+          </a:fillRef>
+          <a:effectRef idx="0">
+            <a:schemeClr val="accent1"/>
+          </a:effectRef>
+          <a:fontRef idx="minor">
+            <a:schemeClr val="lt1"/>
+          </a:fontRef>
+        </p:style>
+        <p:txBody>
+          <a:bodyPr wrap="none" lIns="0" tIns="0" rIns="0" bIns="0" rtlCol="0" anchor="ctr"/>
+          <a:lstStyle/>
+          <a:p>
+            <a:pPr algn="ctr"/>
+            <a:endParaRPr lang="en-US" b="1"/>
+          </a:p>
+        </p:txBody>
+      </p:sp>
+      <p:grpSp>
+        <p:nvGrpSpPr>
+          <p:cNvPr id="113" name="Group 112"/>
+          <p:cNvGrpSpPr/>
+          <p:nvPr/>
+        </p:nvGrpSpPr>
+        <p:grpSpPr>
+          <a:xfrm>
+            <a:off x="1859598" y="4422902"/>
+            <a:ext cx="343904" cy="458320"/>
+            <a:chOff x="4821567" y="919204"/>
+            <a:chExt cx="343904" cy="458320"/>
+          </a:xfrm>
+        </p:grpSpPr>
+        <p:sp>
+          <p:nvSpPr>
+            <p:cNvPr id="115" name="Rectangle 114"/>
+            <p:cNvSpPr/>
+            <p:nvPr/>
+          </p:nvSpPr>
+          <p:spPr>
+            <a:xfrm>
+              <a:off x="4821567" y="971454"/>
+              <a:ext cx="343904" cy="406070"/>
+            </a:xfrm>
+            <a:prstGeom prst="rect">
+              <a:avLst/>
+            </a:prstGeom>
+            <a:solidFill>
+              <a:srgbClr val="0070C0"/>
+            </a:solidFill>
+            <a:ln>
+              <a:noFill/>
+            </a:ln>
+          </p:spPr>
+          <p:style>
+            <a:lnRef idx="2">
+              <a:schemeClr val="accent1">
+                <a:shade val="50000"/>
+              </a:schemeClr>
+            </a:lnRef>
+            <a:fillRef idx="1">
+              <a:schemeClr val="accent1"/>
+            </a:fillRef>
+            <a:effectRef idx="0">
+              <a:schemeClr val="accent1"/>
+            </a:effectRef>
+            <a:fontRef idx="minor">
+              <a:schemeClr val="lt1"/>
+            </a:fontRef>
+          </p:style>
+          <p:txBody>
+            <a:bodyPr rtlCol="0" anchor="ctr"/>
+            <a:lstStyle/>
+            <a:p>
+              <a:pPr algn="ctr"/>
+              <a:endParaRPr lang="en-US" dirty="0"/>
+            </a:p>
+          </p:txBody>
+        </p:sp>
+        <p:sp>
+          <p:nvSpPr>
+            <p:cNvPr id="117" name="Rounded Rectangle 227"/>
+            <p:cNvSpPr/>
+            <p:nvPr/>
+          </p:nvSpPr>
+          <p:spPr>
+            <a:xfrm rot="10800000">
+              <a:off x="4879960" y="919204"/>
+              <a:ext cx="234247" cy="101171"/>
+            </a:xfrm>
+            <a:custGeom>
+              <a:avLst/>
+              <a:gdLst/>
+              <a:ahLst/>
+              <a:cxnLst/>
+              <a:rect l="l" t="t" r="r" b="b"/>
+              <a:pathLst>
+                <a:path w="286327" h="1000124">
+                  <a:moveTo>
+                    <a:pt x="2115" y="0"/>
+                  </a:moveTo>
+                  <a:lnTo>
+                    <a:pt x="284212" y="0"/>
+                  </a:lnTo>
+                  <a:cubicBezTo>
+                    <a:pt x="286188" y="3367"/>
+                    <a:pt x="286327" y="6905"/>
+                    <a:pt x="286327" y="10476"/>
+                  </a:cubicBezTo>
+                  <a:lnTo>
+                    <a:pt x="286327" y="712825"/>
+                  </a:lnTo>
+                  <a:cubicBezTo>
+                    <a:pt x="286327" y="772047"/>
+                    <a:pt x="247915" y="822299"/>
+                    <a:pt x="194109" y="838409"/>
+                  </a:cubicBezTo>
+                  <a:cubicBezTo>
+                    <a:pt x="194108" y="875332"/>
+                    <a:pt x="194108" y="912256"/>
+                    <a:pt x="194108" y="949179"/>
+                  </a:cubicBezTo>
+                  <a:cubicBezTo>
+                    <a:pt x="194108" y="977315"/>
+                    <a:pt x="171299" y="1000124"/>
+                    <a:pt x="143163" y="1000124"/>
+                  </a:cubicBezTo>
+                  <a:lnTo>
+                    <a:pt x="143164" y="1000123"/>
+                  </a:lnTo>
+                  <a:cubicBezTo>
+                    <a:pt x="115028" y="1000123"/>
+                    <a:pt x="92219" y="977314"/>
+                    <a:pt x="92219" y="949178"/>
+                  </a:cubicBezTo>
+                  <a:lnTo>
+                    <a:pt x="92219" y="838409"/>
+                  </a:lnTo>
+                  <a:cubicBezTo>
+                    <a:pt x="38413" y="822299"/>
+                    <a:pt x="0" y="772048"/>
+                    <a:pt x="0" y="712825"/>
+                  </a:cubicBezTo>
+                  <a:lnTo>
+                    <a:pt x="0" y="10476"/>
+                  </a:lnTo>
+                  <a:close/>
+                </a:path>
+              </a:pathLst>
+            </a:custGeom>
+            <a:solidFill>
+              <a:srgbClr val="0070C0"/>
+            </a:solidFill>
+            <a:ln w="19050">
+              <a:solidFill>
+                <a:schemeClr val="bg1"/>
+              </a:solidFill>
+            </a:ln>
+          </p:spPr>
+          <p:style>
+            <a:lnRef idx="2">
+              <a:schemeClr val="accent1">
+                <a:shade val="50000"/>
+              </a:schemeClr>
+            </a:lnRef>
+            <a:fillRef idx="1">
+              <a:schemeClr val="accent1"/>
+            </a:fillRef>
+            <a:effectRef idx="0">
+              <a:schemeClr val="accent1"/>
+            </a:effectRef>
+            <a:fontRef idx="minor">
+              <a:schemeClr val="lt1"/>
+            </a:fontRef>
+          </p:style>
+          <p:txBody>
+            <a:bodyPr rtlCol="0" anchor="ctr"/>
+            <a:lstStyle/>
+            <a:p>
+              <a:pPr algn="ctr"/>
+              <a:endParaRPr lang="en-SG"/>
+            </a:p>
+          </p:txBody>
+        </p:sp>
+      </p:grpSp>
+      <p:grpSp>
+        <p:nvGrpSpPr>
+          <p:cNvPr id="131" name="Group 130"/>
+          <p:cNvGrpSpPr/>
+          <p:nvPr/>
+        </p:nvGrpSpPr>
+        <p:grpSpPr>
+          <a:xfrm>
+            <a:off x="2021107" y="4579540"/>
+            <a:ext cx="368987" cy="366300"/>
+            <a:chOff x="2764335" y="1431261"/>
+            <a:chExt cx="445962" cy="442713"/>
+          </a:xfrm>
+          <a:solidFill>
+            <a:srgbClr val="0070C0"/>
+          </a:solidFill>
+        </p:grpSpPr>
+        <p:sp>
+          <p:nvSpPr>
+            <p:cNvPr id="132" name="Rectangle 131"/>
+            <p:cNvSpPr/>
+            <p:nvPr/>
+          </p:nvSpPr>
+          <p:spPr>
+            <a:xfrm>
+              <a:off x="2764335" y="1431283"/>
+              <a:ext cx="212942" cy="212942"/>
+            </a:xfrm>
+            <a:prstGeom prst="rect">
+              <a:avLst/>
+            </a:prstGeom>
+            <a:grpFill/>
+            <a:ln w="19050">
+              <a:solidFill>
+                <a:schemeClr val="bg1"/>
+              </a:solidFill>
+            </a:ln>
+          </p:spPr>
+          <p:style>
+            <a:lnRef idx="2">
+              <a:schemeClr val="accent1">
+                <a:shade val="50000"/>
+              </a:schemeClr>
+            </a:lnRef>
+            <a:fillRef idx="1">
+              <a:schemeClr val="accent1"/>
+            </a:fillRef>
+            <a:effectRef idx="0">
+              <a:schemeClr val="accent1"/>
+            </a:effectRef>
+            <a:fontRef idx="minor">
+              <a:schemeClr val="lt1"/>
+            </a:fontRef>
+          </p:style>
+          <p:txBody>
+            <a:bodyPr rtlCol="0" anchor="ctr"/>
+            <a:lstStyle/>
+            <a:p>
+              <a:pPr algn="ctr"/>
+              <a:endParaRPr lang="en-US"/>
+            </a:p>
+          </p:txBody>
+        </p:sp>
+        <p:sp>
+          <p:nvSpPr>
+            <p:cNvPr id="140" name="Rectangle 139"/>
+            <p:cNvSpPr/>
+            <p:nvPr/>
+          </p:nvSpPr>
+          <p:spPr>
+            <a:xfrm>
+              <a:off x="2765652" y="1641480"/>
+              <a:ext cx="212942" cy="212942"/>
+            </a:xfrm>
+            <a:prstGeom prst="rect">
+              <a:avLst/>
+            </a:prstGeom>
+            <a:grpFill/>
+            <a:ln w="19050">
+              <a:solidFill>
+                <a:schemeClr val="bg1"/>
+              </a:solidFill>
+            </a:ln>
+          </p:spPr>
+          <p:style>
+            <a:lnRef idx="2">
+              <a:schemeClr val="accent1">
+                <a:shade val="50000"/>
+              </a:schemeClr>
+            </a:lnRef>
+            <a:fillRef idx="1">
+              <a:schemeClr val="accent1"/>
+            </a:fillRef>
+            <a:effectRef idx="0">
+              <a:schemeClr val="accent1"/>
+            </a:effectRef>
+            <a:fontRef idx="minor">
+              <a:schemeClr val="lt1"/>
+            </a:fontRef>
+          </p:style>
+          <p:txBody>
+            <a:bodyPr rtlCol="0" anchor="ctr"/>
+            <a:lstStyle/>
+            <a:p>
+              <a:pPr algn="ctr"/>
+              <a:endParaRPr lang="en-US"/>
+            </a:p>
+          </p:txBody>
+        </p:sp>
+        <p:sp>
+          <p:nvSpPr>
+            <p:cNvPr id="141" name="Rectangle 140"/>
+            <p:cNvSpPr/>
+            <p:nvPr/>
+          </p:nvSpPr>
+          <p:spPr>
+            <a:xfrm>
+              <a:off x="2979312" y="1431261"/>
+              <a:ext cx="212942" cy="212942"/>
+            </a:xfrm>
+            <a:prstGeom prst="rect">
+              <a:avLst/>
+            </a:prstGeom>
+            <a:grpFill/>
+            <a:ln w="19050">
+              <a:solidFill>
+                <a:schemeClr val="bg1"/>
+              </a:solidFill>
+            </a:ln>
+          </p:spPr>
+          <p:style>
+            <a:lnRef idx="2">
+              <a:schemeClr val="accent1">
+                <a:shade val="50000"/>
+              </a:schemeClr>
+            </a:lnRef>
+            <a:fillRef idx="1">
+              <a:schemeClr val="accent1"/>
+            </a:fillRef>
+            <a:effectRef idx="0">
+              <a:schemeClr val="accent1"/>
+            </a:effectRef>
+            <a:fontRef idx="minor">
+              <a:schemeClr val="lt1"/>
+            </a:fontRef>
+          </p:style>
+          <p:txBody>
+            <a:bodyPr rtlCol="0" anchor="ctr"/>
+            <a:lstStyle/>
+            <a:p>
+              <a:pPr algn="ctr"/>
+              <a:endParaRPr lang="en-US"/>
+            </a:p>
+          </p:txBody>
+        </p:sp>
+        <p:sp>
+          <p:nvSpPr>
+            <p:cNvPr id="142" name="Cross 141"/>
+            <p:cNvSpPr/>
+            <p:nvPr/>
+          </p:nvSpPr>
+          <p:spPr>
+            <a:xfrm>
+              <a:off x="3019069" y="1682747"/>
+              <a:ext cx="191228" cy="191227"/>
+            </a:xfrm>
+            <a:prstGeom prst="plus">
+              <a:avLst>
+                <a:gd name="adj" fmla="val 33338"/>
+              </a:avLst>
+            </a:prstGeom>
+            <a:grpFill/>
+            <a:ln w="19050">
+              <a:solidFill>
+                <a:schemeClr val="bg1"/>
+              </a:solidFill>
+            </a:ln>
+          </p:spPr>
+          <p:style>
+            <a:lnRef idx="2">
+              <a:schemeClr val="accent1">
+                <a:shade val="50000"/>
+              </a:schemeClr>
+            </a:lnRef>
+            <a:fillRef idx="1">
+              <a:schemeClr val="accent1"/>
+            </a:fillRef>
+            <a:effectRef idx="0">
+              <a:schemeClr val="accent1"/>
+            </a:effectRef>
+            <a:fontRef idx="minor">
+              <a:schemeClr val="lt1"/>
+            </a:fontRef>
+          </p:style>
+          <p:txBody>
+            <a:bodyPr rtlCol="0" anchor="ctr"/>
+            <a:lstStyle/>
+            <a:p>
+              <a:pPr algn="ctr"/>
+              <a:endParaRPr lang="en-US"/>
+            </a:p>
+          </p:txBody>
+        </p:sp>
+      </p:grpSp>
+      <p:sp>
+        <p:nvSpPr>
+          <p:cNvPr id="143" name="Rectangle 142"/>
+          <p:cNvSpPr/>
+          <p:nvPr/>
+        </p:nvSpPr>
+        <p:spPr>
+          <a:xfrm rot="10800000">
+            <a:off x="2784509" y="3016576"/>
+            <a:ext cx="549071" cy="549822"/>
+          </a:xfrm>
+          <a:prstGeom prst="rect">
+            <a:avLst/>
+          </a:prstGeom>
+          <a:solidFill>
+            <a:schemeClr val="bg2">
+              <a:lumMod val="75000"/>
+            </a:schemeClr>
+          </a:solidFill>
+          <a:ln>
+            <a:noFill/>
+          </a:ln>
+        </p:spPr>
+        <p:style>
+          <a:lnRef idx="2">
+            <a:schemeClr val="accent1">
+              <a:shade val="50000"/>
+            </a:schemeClr>
+          </a:lnRef>
+          <a:fillRef idx="1">
+            <a:schemeClr val="accent1"/>
+          </a:fillRef>
+          <a:effectRef idx="0">
+            <a:schemeClr val="accent1"/>
+          </a:effectRef>
+          <a:fontRef idx="minor">
+            <a:schemeClr val="lt1"/>
+          </a:fontRef>
+        </p:style>
+        <p:txBody>
+          <a:bodyPr wrap="none" lIns="0" tIns="0" rIns="0" bIns="0" rtlCol="0" anchor="ctr"/>
+          <a:lstStyle/>
+          <a:p>
+            <a:pPr algn="ctr"/>
+            <a:endParaRPr lang="en-US" b="1"/>
+          </a:p>
+        </p:txBody>
+      </p:sp>
+      <p:grpSp>
+        <p:nvGrpSpPr>
+          <p:cNvPr id="144" name="Group 143"/>
+          <p:cNvGrpSpPr/>
+          <p:nvPr/>
+        </p:nvGrpSpPr>
+        <p:grpSpPr>
+          <a:xfrm>
+            <a:off x="2792072" y="3031732"/>
+            <a:ext cx="343904" cy="458320"/>
+            <a:chOff x="4821567" y="919204"/>
+            <a:chExt cx="343904" cy="458320"/>
+          </a:xfrm>
+        </p:grpSpPr>
+        <p:sp>
+          <p:nvSpPr>
+            <p:cNvPr id="145" name="Rectangle 144"/>
+            <p:cNvSpPr/>
+            <p:nvPr/>
+          </p:nvSpPr>
+          <p:spPr>
+            <a:xfrm>
+              <a:off x="4821567" y="971454"/>
+              <a:ext cx="343904" cy="406070"/>
+            </a:xfrm>
+            <a:prstGeom prst="rect">
+              <a:avLst/>
+            </a:prstGeom>
+            <a:solidFill>
+              <a:srgbClr val="0070C0"/>
+            </a:solidFill>
+            <a:ln>
+              <a:noFill/>
+            </a:ln>
+          </p:spPr>
+          <p:style>
+            <a:lnRef idx="2">
+              <a:schemeClr val="accent1">
+                <a:shade val="50000"/>
+              </a:schemeClr>
+            </a:lnRef>
+            <a:fillRef idx="1">
+              <a:schemeClr val="accent1"/>
+            </a:fillRef>
+            <a:effectRef idx="0">
+              <a:schemeClr val="accent1"/>
+            </a:effectRef>
+            <a:fontRef idx="minor">
+              <a:schemeClr val="lt1"/>
+            </a:fontRef>
+          </p:style>
+          <p:txBody>
+            <a:bodyPr rtlCol="0" anchor="ctr"/>
+            <a:lstStyle/>
+            <a:p>
+              <a:pPr algn="ctr"/>
+              <a:endParaRPr lang="en-US" dirty="0"/>
+            </a:p>
+          </p:txBody>
+        </p:sp>
+        <p:sp>
+          <p:nvSpPr>
+            <p:cNvPr id="146" name="Rounded Rectangle 227"/>
+            <p:cNvSpPr/>
+            <p:nvPr/>
+          </p:nvSpPr>
+          <p:spPr>
+            <a:xfrm rot="10800000">
+              <a:off x="4879960" y="919204"/>
+              <a:ext cx="234247" cy="101171"/>
+            </a:xfrm>
+            <a:custGeom>
+              <a:avLst/>
+              <a:gdLst/>
+              <a:ahLst/>
+              <a:cxnLst/>
+              <a:rect l="l" t="t" r="r" b="b"/>
+              <a:pathLst>
+                <a:path w="286327" h="1000124">
+                  <a:moveTo>
+                    <a:pt x="2115" y="0"/>
+                  </a:moveTo>
+                  <a:lnTo>
+                    <a:pt x="284212" y="0"/>
+                  </a:lnTo>
+                  <a:cubicBezTo>
+                    <a:pt x="286188" y="3367"/>
+                    <a:pt x="286327" y="6905"/>
+                    <a:pt x="286327" y="10476"/>
+                  </a:cubicBezTo>
+                  <a:lnTo>
+                    <a:pt x="286327" y="712825"/>
+                  </a:lnTo>
+                  <a:cubicBezTo>
+                    <a:pt x="286327" y="772047"/>
+                    <a:pt x="247915" y="822299"/>
+                    <a:pt x="194109" y="838409"/>
+                  </a:cubicBezTo>
+                  <a:cubicBezTo>
+                    <a:pt x="194108" y="875332"/>
+                    <a:pt x="194108" y="912256"/>
+                    <a:pt x="194108" y="949179"/>
+                  </a:cubicBezTo>
+                  <a:cubicBezTo>
+                    <a:pt x="194108" y="977315"/>
+                    <a:pt x="171299" y="1000124"/>
+                    <a:pt x="143163" y="1000124"/>
+                  </a:cubicBezTo>
+                  <a:lnTo>
+                    <a:pt x="143164" y="1000123"/>
+                  </a:lnTo>
+                  <a:cubicBezTo>
+                    <a:pt x="115028" y="1000123"/>
+                    <a:pt x="92219" y="977314"/>
+                    <a:pt x="92219" y="949178"/>
+                  </a:cubicBezTo>
+                  <a:lnTo>
+                    <a:pt x="92219" y="838409"/>
+                  </a:lnTo>
+                  <a:cubicBezTo>
+                    <a:pt x="38413" y="822299"/>
+                    <a:pt x="0" y="772048"/>
+                    <a:pt x="0" y="712825"/>
+                  </a:cubicBezTo>
+                  <a:lnTo>
+                    <a:pt x="0" y="10476"/>
+                  </a:lnTo>
+                  <a:close/>
+                </a:path>
+              </a:pathLst>
+            </a:custGeom>
+            <a:solidFill>
+              <a:srgbClr val="0070C0"/>
+            </a:solidFill>
+            <a:ln w="19050">
+              <a:solidFill>
+                <a:schemeClr val="bg1"/>
+              </a:solidFill>
+            </a:ln>
+          </p:spPr>
+          <p:style>
+            <a:lnRef idx="2">
+              <a:schemeClr val="accent1">
+                <a:shade val="50000"/>
+              </a:schemeClr>
+            </a:lnRef>
+            <a:fillRef idx="1">
+              <a:schemeClr val="accent1"/>
+            </a:fillRef>
+            <a:effectRef idx="0">
+              <a:schemeClr val="accent1"/>
+            </a:effectRef>
+            <a:fontRef idx="minor">
+              <a:schemeClr val="lt1"/>
+            </a:fontRef>
+          </p:style>
+          <p:txBody>
+            <a:bodyPr rtlCol="0" anchor="ctr"/>
+            <a:lstStyle/>
+            <a:p>
+              <a:pPr algn="ctr"/>
+              <a:endParaRPr lang="en-SG"/>
+            </a:p>
+          </p:txBody>
+        </p:sp>
+      </p:grpSp>
+      <p:sp>
+        <p:nvSpPr>
+          <p:cNvPr id="147" name="Rectangle: Folded Corner 146"/>
+          <p:cNvSpPr/>
+          <p:nvPr/>
+        </p:nvSpPr>
+        <p:spPr>
+          <a:xfrm rot="10800000" flipH="1">
+            <a:off x="3028896" y="3204124"/>
+            <a:ext cx="277140" cy="338178"/>
+          </a:xfrm>
+          <a:prstGeom prst="foldedCorner">
+            <a:avLst>
+              <a:gd name="adj" fmla="val 44103"/>
+            </a:avLst>
+          </a:prstGeom>
+          <a:solidFill>
+            <a:srgbClr val="0070C0"/>
+          </a:solidFill>
+          <a:ln w="19050">
+            <a:solidFill>
+              <a:schemeClr val="bg1"/>
             </a:solidFill>
           </a:ln>
         </p:spPr>

</xml_diff>